<commit_message>
parsing json to view html
</commit_message>
<xml_diff>
--- a/#6 JS Looping/Perulangan dan Array JS.pptx
+++ b/#6 JS Looping/Perulangan dan Array JS.pptx
@@ -3793,8 +3793,8 @@
         </p:nvSpPr>
         <p:spPr>
           <a:xfrm>
-            <a:off x="5046345" y="1773555"/>
-            <a:ext cx="7706995" cy="4523740"/>
+            <a:off x="-494030" y="-414020"/>
+            <a:ext cx="13247370" cy="6711315"/>
           </a:xfrm>
           <a:prstGeom prst="rect">
             <a:avLst/>

</xml_diff>